<commit_message>
made updates to the python script and power point presentation
</commit_message>
<xml_diff>
--- a/New York City Traffic Analysis.pptx
+++ b/New York City Traffic Analysis.pptx
@@ -206,7 +206,7 @@
           <a:p>
             <a:fld id="{0B72112C-A424-FD46-9517-7C0FF21C2054}" type="datetimeFigureOut">
               <a:rPr lang="en-US" smtClean="0"/>
-              <a:t>1/9/24</a:t>
+              <a:t>1/10/24</a:t>
             </a:fld>
             <a:endParaRPr lang="en-US"/>
           </a:p>
@@ -5603,10 +5603,10 @@
       </p:sp>
       <p:pic>
         <p:nvPicPr>
-          <p:cNvPr id="2" name="Picture 1">
+          <p:cNvPr id="4" name="Picture 3">
             <a:extLst>
               <a:ext uri="{FF2B5EF4-FFF2-40B4-BE49-F238E27FC236}">
-                <a16:creationId xmlns:a16="http://schemas.microsoft.com/office/drawing/2014/main" id="{8D2FF1CB-2B65-EA32-7214-933BF97853EE}"/>
+                <a16:creationId xmlns:a16="http://schemas.microsoft.com/office/drawing/2014/main" id="{0313415D-513A-8E48-F9A5-E93D5B31B54D}"/>
               </a:ext>
             </a:extLst>
           </p:cNvPr>
@@ -5623,38 +5623,8 @@
         </p:blipFill>
         <p:spPr>
           <a:xfrm>
-            <a:off x="457851" y="1690920"/>
-            <a:ext cx="6923609" cy="4768214"/>
-          </a:xfrm>
-          <a:prstGeom prst="rect">
-            <a:avLst/>
-          </a:prstGeom>
-        </p:spPr>
-      </p:pic>
-      <p:pic>
-        <p:nvPicPr>
-          <p:cNvPr id="3" name="Picture 2">
-            <a:extLst>
-              <a:ext uri="{FF2B5EF4-FFF2-40B4-BE49-F238E27FC236}">
-                <a16:creationId xmlns:a16="http://schemas.microsoft.com/office/drawing/2014/main" id="{E56E202E-67FD-29D3-2B49-35C044390BCA}"/>
-              </a:ext>
-            </a:extLst>
-          </p:cNvPr>
-          <p:cNvPicPr>
-            <a:picLocks noChangeAspect="1"/>
-          </p:cNvPicPr>
-          <p:nvPr/>
-        </p:nvPicPr>
-        <p:blipFill>
-          <a:blip r:embed="rId3"/>
-          <a:stretch>
-            <a:fillRect/>
-          </a:stretch>
-        </p:blipFill>
-        <p:spPr>
-          <a:xfrm>
-            <a:off x="8013219" y="2821583"/>
-            <a:ext cx="3777533" cy="2413025"/>
+            <a:off x="2303323" y="1598566"/>
+            <a:ext cx="6422036" cy="4607784"/>
           </a:xfrm>
           <a:prstGeom prst="rect">
             <a:avLst/>
@@ -5824,10 +5794,10 @@
       </p:sp>
       <p:pic>
         <p:nvPicPr>
-          <p:cNvPr id="2" name="Picture 1">
+          <p:cNvPr id="4" name="Picture 3">
             <a:extLst>
               <a:ext uri="{FF2B5EF4-FFF2-40B4-BE49-F238E27FC236}">
-                <a16:creationId xmlns:a16="http://schemas.microsoft.com/office/drawing/2014/main" id="{25916975-8486-1EC9-2F56-8A82A1C8CA04}"/>
+                <a16:creationId xmlns:a16="http://schemas.microsoft.com/office/drawing/2014/main" id="{4F668857-3000-9B1E-E84F-9737F9F60AEE}"/>
               </a:ext>
             </a:extLst>
           </p:cNvPr>
@@ -5844,38 +5814,8 @@
         </p:blipFill>
         <p:spPr>
           <a:xfrm>
-            <a:off x="959678" y="1524000"/>
-            <a:ext cx="7296426" cy="4782102"/>
-          </a:xfrm>
-          <a:prstGeom prst="rect">
-            <a:avLst/>
-          </a:prstGeom>
-        </p:spPr>
-      </p:pic>
-      <p:pic>
-        <p:nvPicPr>
-          <p:cNvPr id="3" name="Picture 2">
-            <a:extLst>
-              <a:ext uri="{FF2B5EF4-FFF2-40B4-BE49-F238E27FC236}">
-                <a16:creationId xmlns:a16="http://schemas.microsoft.com/office/drawing/2014/main" id="{300C0B28-0EC6-5A82-85A7-09A5BB6BCBE3}"/>
-              </a:ext>
-            </a:extLst>
-          </p:cNvPr>
-          <p:cNvPicPr>
-            <a:picLocks noChangeAspect="1"/>
-          </p:cNvPicPr>
-          <p:nvPr/>
-        </p:nvPicPr>
-        <p:blipFill>
-          <a:blip r:embed="rId3"/>
-          <a:stretch>
-            <a:fillRect/>
-          </a:stretch>
-        </p:blipFill>
-        <p:spPr>
-          <a:xfrm>
-            <a:off x="9759122" y="1524000"/>
-            <a:ext cx="1473200" cy="4813300"/>
+            <a:off x="1824210" y="1283724"/>
+            <a:ext cx="7154537" cy="4958260"/>
           </a:xfrm>
           <a:prstGeom prst="rect">
             <a:avLst/>
@@ -6044,10 +5984,10 @@
       </p:sp>
       <p:pic>
         <p:nvPicPr>
-          <p:cNvPr id="2" name="Picture 1">
+          <p:cNvPr id="4" name="Picture 3">
             <a:extLst>
               <a:ext uri="{FF2B5EF4-FFF2-40B4-BE49-F238E27FC236}">
-                <a16:creationId xmlns:a16="http://schemas.microsoft.com/office/drawing/2014/main" id="{019B97E7-0646-40F2-98BB-75A760B78D2C}"/>
+                <a16:creationId xmlns:a16="http://schemas.microsoft.com/office/drawing/2014/main" id="{7770F20E-B572-C182-243C-97B6E294789A}"/>
               </a:ext>
             </a:extLst>
           </p:cNvPr>
@@ -6064,38 +6004,8 @@
         </p:blipFill>
         <p:spPr>
           <a:xfrm>
-            <a:off x="654300" y="1493906"/>
-            <a:ext cx="7569200" cy="4959902"/>
-          </a:xfrm>
-          <a:prstGeom prst="rect">
-            <a:avLst/>
-          </a:prstGeom>
-        </p:spPr>
-      </p:pic>
-      <p:pic>
-        <p:nvPicPr>
-          <p:cNvPr id="3" name="Picture 2">
-            <a:extLst>
-              <a:ext uri="{FF2B5EF4-FFF2-40B4-BE49-F238E27FC236}">
-                <a16:creationId xmlns:a16="http://schemas.microsoft.com/office/drawing/2014/main" id="{9BE21FA7-BAB3-20CC-1E8B-FBE3D21B2991}"/>
-              </a:ext>
-            </a:extLst>
-          </p:cNvPr>
-          <p:cNvPicPr>
-            <a:picLocks noChangeAspect="1"/>
-          </p:cNvPicPr>
-          <p:nvPr/>
-        </p:nvPicPr>
-        <p:blipFill>
-          <a:blip r:embed="rId3"/>
-          <a:stretch>
-            <a:fillRect/>
-          </a:stretch>
-        </p:blipFill>
-        <p:spPr>
-          <a:xfrm>
-            <a:off x="9556640" y="1493906"/>
-            <a:ext cx="1612900" cy="4826000"/>
+            <a:off x="1680991" y="1215382"/>
+            <a:ext cx="6790980" cy="4829141"/>
           </a:xfrm>
           <a:prstGeom prst="rect">
             <a:avLst/>
@@ -6263,36 +6173,6 @@
           </a:p>
         </p:txBody>
       </p:sp>
-      <p:pic>
-        <p:nvPicPr>
-          <p:cNvPr id="2" name="Picture 1">
-            <a:extLst>
-              <a:ext uri="{FF2B5EF4-FFF2-40B4-BE49-F238E27FC236}">
-                <a16:creationId xmlns:a16="http://schemas.microsoft.com/office/drawing/2014/main" id="{BAE82619-4342-37AC-29FB-AF16612326BA}"/>
-              </a:ext>
-            </a:extLst>
-          </p:cNvPr>
-          <p:cNvPicPr>
-            <a:picLocks noChangeAspect="1"/>
-          </p:cNvPicPr>
-          <p:nvPr/>
-        </p:nvPicPr>
-        <p:blipFill>
-          <a:blip r:embed="rId2"/>
-          <a:stretch>
-            <a:fillRect/>
-          </a:stretch>
-        </p:blipFill>
-        <p:spPr>
-          <a:xfrm>
-            <a:off x="928324" y="1948608"/>
-            <a:ext cx="5825016" cy="4442809"/>
-          </a:xfrm>
-          <a:prstGeom prst="rect">
-            <a:avLst/>
-          </a:prstGeom>
-        </p:spPr>
-      </p:pic>
       <p:graphicFrame>
         <p:nvGraphicFramePr>
           <p:cNvPr id="4" name="Table 3">
@@ -6633,6 +6513,36 @@
           </a:graphicData>
         </a:graphic>
       </p:graphicFrame>
+      <p:pic>
+        <p:nvPicPr>
+          <p:cNvPr id="3" name="Picture 2">
+            <a:extLst>
+              <a:ext uri="{FF2B5EF4-FFF2-40B4-BE49-F238E27FC236}">
+                <a16:creationId xmlns:a16="http://schemas.microsoft.com/office/drawing/2014/main" id="{4AA679C7-4BED-998C-69DD-26DFB80D8449}"/>
+              </a:ext>
+            </a:extLst>
+          </p:cNvPr>
+          <p:cNvPicPr>
+            <a:picLocks noChangeAspect="1"/>
+          </p:cNvPicPr>
+          <p:nvPr/>
+        </p:nvPicPr>
+        <p:blipFill>
+          <a:blip r:embed="rId2"/>
+          <a:stretch>
+            <a:fillRect/>
+          </a:stretch>
+        </p:blipFill>
+        <p:spPr>
+          <a:xfrm>
+            <a:off x="926215" y="1986261"/>
+            <a:ext cx="6258941" cy="4310857"/>
+          </a:xfrm>
+          <a:prstGeom prst="rect">
+            <a:avLst/>
+          </a:prstGeom>
+        </p:spPr>
+      </p:pic>
     </p:spTree>
   </p:cSld>
   <p:clrMapOvr>
@@ -6796,10 +6706,10 @@
       </p:sp>
       <p:pic>
         <p:nvPicPr>
-          <p:cNvPr id="4" name="Picture 3">
+          <p:cNvPr id="2" name="Picture 1">
             <a:extLst>
               <a:ext uri="{FF2B5EF4-FFF2-40B4-BE49-F238E27FC236}">
-                <a16:creationId xmlns:a16="http://schemas.microsoft.com/office/drawing/2014/main" id="{65087C65-7884-36CA-D0F4-3419653F7B8B}"/>
+                <a16:creationId xmlns:a16="http://schemas.microsoft.com/office/drawing/2014/main" id="{4BD70629-3C85-B2D9-1C69-0F0564134710}"/>
               </a:ext>
             </a:extLst>
           </p:cNvPr>
@@ -6816,8 +6726,8 @@
         </p:blipFill>
         <p:spPr>
           <a:xfrm>
-            <a:off x="204028" y="1042200"/>
-            <a:ext cx="5891972" cy="4721087"/>
+            <a:off x="204029" y="1055155"/>
+            <a:ext cx="5712030" cy="4254975"/>
           </a:xfrm>
           <a:prstGeom prst="rect">
             <a:avLst/>
@@ -6826,10 +6736,10 @@
       </p:pic>
       <p:pic>
         <p:nvPicPr>
-          <p:cNvPr id="5" name="Picture 4">
+          <p:cNvPr id="3" name="Picture 2">
             <a:extLst>
               <a:ext uri="{FF2B5EF4-FFF2-40B4-BE49-F238E27FC236}">
-                <a16:creationId xmlns:a16="http://schemas.microsoft.com/office/drawing/2014/main" id="{AAB19A03-14E7-806A-8689-1108AF336F02}"/>
+                <a16:creationId xmlns:a16="http://schemas.microsoft.com/office/drawing/2014/main" id="{D339D8A2-2218-0269-0B57-3AB74D502548}"/>
               </a:ext>
             </a:extLst>
           </p:cNvPr>
@@ -6846,68 +6756,8 @@
         </p:blipFill>
         <p:spPr>
           <a:xfrm>
-            <a:off x="6141830" y="1055155"/>
-            <a:ext cx="5846142" cy="4708132"/>
-          </a:xfrm>
-          <a:prstGeom prst="rect">
-            <a:avLst/>
-          </a:prstGeom>
-        </p:spPr>
-      </p:pic>
-      <p:pic>
-        <p:nvPicPr>
-          <p:cNvPr id="6" name="Picture 5">
-            <a:extLst>
-              <a:ext uri="{FF2B5EF4-FFF2-40B4-BE49-F238E27FC236}">
-                <a16:creationId xmlns:a16="http://schemas.microsoft.com/office/drawing/2014/main" id="{6D5E6375-CFFB-F03F-2E1C-065AD4974C84}"/>
-              </a:ext>
-            </a:extLst>
-          </p:cNvPr>
-          <p:cNvPicPr>
-            <a:picLocks noChangeAspect="1"/>
-          </p:cNvPicPr>
-          <p:nvPr/>
-        </p:nvPicPr>
-        <p:blipFill>
-          <a:blip r:embed="rId4"/>
-          <a:stretch>
-            <a:fillRect/>
-          </a:stretch>
-        </p:blipFill>
-        <p:spPr>
-          <a:xfrm>
-            <a:off x="806864" y="6053207"/>
-            <a:ext cx="4686300" cy="317500"/>
-          </a:xfrm>
-          <a:prstGeom prst="rect">
-            <a:avLst/>
-          </a:prstGeom>
-        </p:spPr>
-      </p:pic>
-      <p:pic>
-        <p:nvPicPr>
-          <p:cNvPr id="8" name="Picture 7">
-            <a:extLst>
-              <a:ext uri="{FF2B5EF4-FFF2-40B4-BE49-F238E27FC236}">
-                <a16:creationId xmlns:a16="http://schemas.microsoft.com/office/drawing/2014/main" id="{3DD5B2E2-D9F2-E41A-3A46-FFA2C685925E}"/>
-              </a:ext>
-            </a:extLst>
-          </p:cNvPr>
-          <p:cNvPicPr>
-            <a:picLocks noChangeAspect="1"/>
-          </p:cNvPicPr>
-          <p:nvPr/>
-        </p:nvPicPr>
-        <p:blipFill>
-          <a:blip r:embed="rId5"/>
-          <a:stretch>
-            <a:fillRect/>
-          </a:stretch>
-        </p:blipFill>
-        <p:spPr>
-          <a:xfrm>
-            <a:off x="7286901" y="6040507"/>
-            <a:ext cx="3556000" cy="330200"/>
+            <a:off x="6096000" y="1042201"/>
+            <a:ext cx="5504761" cy="4257132"/>
           </a:xfrm>
           <a:prstGeom prst="rect">
             <a:avLst/>

</xml_diff>

<commit_message>
few updates to the deck and removal of some comments from the python script
</commit_message>
<xml_diff>
--- a/New York City Traffic Analysis.pptx
+++ b/New York City Traffic Analysis.pptx
@@ -5,19 +5,21 @@
     <p:sldMasterId id="2147483648" r:id="rId1"/>
   </p:sldMasterIdLst>
   <p:notesMasterIdLst>
-    <p:notesMasterId r:id="rId12"/>
+    <p:notesMasterId r:id="rId14"/>
   </p:notesMasterIdLst>
   <p:sldIdLst>
     <p:sldId id="256" r:id="rId2"/>
-    <p:sldId id="257" r:id="rId3"/>
-    <p:sldId id="258" r:id="rId4"/>
-    <p:sldId id="259" r:id="rId5"/>
-    <p:sldId id="261" r:id="rId6"/>
-    <p:sldId id="260" r:id="rId7"/>
-    <p:sldId id="267" r:id="rId8"/>
-    <p:sldId id="262" r:id="rId9"/>
-    <p:sldId id="265" r:id="rId10"/>
-    <p:sldId id="264" r:id="rId11"/>
+    <p:sldId id="269" r:id="rId3"/>
+    <p:sldId id="268" r:id="rId4"/>
+    <p:sldId id="257" r:id="rId5"/>
+    <p:sldId id="258" r:id="rId6"/>
+    <p:sldId id="259" r:id="rId7"/>
+    <p:sldId id="261" r:id="rId8"/>
+    <p:sldId id="260" r:id="rId9"/>
+    <p:sldId id="267" r:id="rId10"/>
+    <p:sldId id="262" r:id="rId11"/>
+    <p:sldId id="265" r:id="rId12"/>
+    <p:sldId id="264" r:id="rId13"/>
   </p:sldIdLst>
   <p:sldSz cx="12192000" cy="6858000"/>
   <p:notesSz cx="7772400" cy="10058400"/>
@@ -206,7 +208,7 @@
           <a:p>
             <a:fld id="{0B72112C-A424-FD46-9517-7C0FF21C2054}" type="datetimeFigureOut">
               <a:rPr lang="en-US" smtClean="0"/>
-              <a:t>1/10/24</a:t>
+              <a:t>1/11/24</a:t>
             </a:fld>
             <a:endParaRPr lang="en-US"/>
           </a:p>
@@ -622,7 +624,7 @@
           <a:p>
             <a:fld id="{AAFEF7A2-7B07-D144-9548-4D84503009E2}" type="slidenum">
               <a:rPr lang="en-US" smtClean="0"/>
-              <a:t>10</a:t>
+              <a:t>12</a:t>
             </a:fld>
             <a:endParaRPr lang="en-US"/>
           </a:p>
@@ -4202,7 +4204,7 @@
         </p:nvSpPr>
         <p:spPr>
           <a:xfrm>
-            <a:off x="835440" y="2206487"/>
+            <a:off x="832800" y="1972620"/>
             <a:ext cx="4633200" cy="2912400"/>
           </a:xfrm>
           <a:prstGeom prst="rect">
@@ -4254,32 +4256,17 @@
           </a:p>
           <a:p>
             <a:pPr marL="0" indent="0">
-              <a:lnSpc>
-                <a:spcPct val="110000"/>
-              </a:lnSpc>
-              <a:spcBef>
-                <a:spcPts val="1001"/>
-              </a:spcBef>
-              <a:buClr>
-                <a:srgbClr val="67B346"/>
-              </a:buClr>
               <a:buNone/>
             </a:pPr>
             <a:r>
-              <a:rPr lang="en-US" spc="-1" dirty="0">
-                <a:solidFill>
-                  <a:srgbClr val="412624"/>
-                </a:solidFill>
-                <a:latin typeface="Avenir Next LT Pro"/>
+              <a:rPr lang="en-US" b="0" i="0" u="sng" dirty="0">
+                <a:effectLst/>
+                <a:latin typeface="-apple-system"/>
+                <a:hlinkClick r:id="rId3"/>
               </a:rPr>
-              <a:t>Collisions from 2012 to 2023</a:t>
+              <a:t>https://catalog.data.gov/dataset/motor-vehicle-collisions-crashes</a:t>
             </a:r>
-            <a:endParaRPr lang="en-US" spc="-1" dirty="0">
-              <a:solidFill>
-                <a:srgbClr val="FFFFFF"/>
-              </a:solidFill>
-              <a:latin typeface="Avenir Next LT Pro"/>
-            </a:endParaRPr>
+            <a:endParaRPr lang="en-US" dirty="0"/>
           </a:p>
         </p:txBody>
       </p:sp>
@@ -4409,13 +4396,13 @@
           <p:nvPr/>
         </p:nvPicPr>
         <p:blipFill>
-          <a:blip r:embed="rId3">
+          <a:blip r:embed="rId4">
             <a:extLst>
               <a:ext uri="{28A0092B-C50C-407E-A947-70E740481C1C}">
                 <a14:useLocalDpi xmlns:a14="http://schemas.microsoft.com/office/drawing/2010/main" val="0"/>
               </a:ext>
               <a:ext uri="{837473B0-CC2E-450A-ABE3-18F120FF3D39}">
-                <a1611:picAttrSrcUrl xmlns:a1611="http://schemas.microsoft.com/office/drawing/2016/11/main" r:id="rId4"/>
+                <a1611:picAttrSrcUrl xmlns:a1611="http://schemas.microsoft.com/office/drawing/2016/11/main" r:id="rId5"/>
               </a:ext>
             </a:extLst>
           </a:blip>
@@ -4448,13 +4435,13 @@
           <p:nvPr/>
         </p:nvPicPr>
         <p:blipFill>
-          <a:blip r:embed="rId5">
+          <a:blip r:embed="rId6">
             <a:extLst>
               <a:ext uri="{28A0092B-C50C-407E-A947-70E740481C1C}">
                 <a14:useLocalDpi xmlns:a14="http://schemas.microsoft.com/office/drawing/2010/main" val="0"/>
               </a:ext>
               <a:ext uri="{837473B0-CC2E-450A-ABE3-18F120FF3D39}">
-                <a1611:picAttrSrcUrl xmlns:a1611="http://schemas.microsoft.com/office/drawing/2016/11/main" r:id="rId6"/>
+                <a1611:picAttrSrcUrl xmlns:a1611="http://schemas.microsoft.com/office/drawing/2016/11/main" r:id="rId7"/>
               </a:ext>
             </a:extLst>
           </a:blip>
@@ -4652,6 +4639,453 @@
 </file>
 
 <file path=ppt/slides/slide10.xml><?xml version="1.0" encoding="utf-8"?>
+<p:sld xmlns:a="http://schemas.openxmlformats.org/drawingml/2006/main" xmlns:r="http://schemas.openxmlformats.org/officeDocument/2006/relationships" xmlns:p="http://schemas.openxmlformats.org/presentationml/2006/main">
+  <p:cSld>
+    <p:spTree>
+      <p:nvGrpSpPr>
+        <p:cNvPr id="1" name=""/>
+        <p:cNvGrpSpPr/>
+        <p:nvPr/>
+      </p:nvGrpSpPr>
+      <p:grpSpPr>
+        <a:xfrm>
+          <a:off x="0" y="0"/>
+          <a:ext cx="0" cy="0"/>
+          <a:chOff x="0" y="0"/>
+          <a:chExt cx="0" cy="0"/>
+        </a:xfrm>
+      </p:grpSpPr>
+      <p:sp>
+        <p:nvSpPr>
+          <p:cNvPr id="65" name="PlaceHolder 1"/>
+          <p:cNvSpPr>
+            <a:spLocks noGrp="1"/>
+          </p:cNvSpPr>
+          <p:nvPr>
+            <p:ph type="title"/>
+          </p:nvPr>
+        </p:nvSpPr>
+        <p:spPr>
+          <a:xfrm>
+            <a:off x="838080" y="365760"/>
+            <a:ext cx="10515240" cy="1325160"/>
+          </a:xfrm>
+          <a:prstGeom prst="rect">
+            <a:avLst/>
+          </a:prstGeom>
+          <a:noFill/>
+          <a:ln w="0">
+            <a:noFill/>
+          </a:ln>
+        </p:spPr>
+        <p:txBody>
+          <a:bodyPr anchor="ctr">
+            <a:noAutofit/>
+          </a:bodyPr>
+          <a:lstStyle/>
+          <a:p>
+            <a:pPr indent="0">
+              <a:lnSpc>
+                <a:spcPct val="100000"/>
+              </a:lnSpc>
+              <a:buNone/>
+            </a:pPr>
+            <a:r>
+              <a:rPr lang="en-US" sz="4400" b="1" strike="noStrike" spc="-1" dirty="0">
+                <a:solidFill>
+                  <a:srgbClr val="FFFFFF"/>
+                </a:solidFill>
+                <a:latin typeface="Avenir Next LT Pro"/>
+              </a:rPr>
+              <a:t>Top 5 factors for collisions</a:t>
+            </a:r>
+            <a:endParaRPr lang="en-US" sz="4400" b="0" strike="noStrike" spc="-1" dirty="0">
+              <a:solidFill>
+                <a:srgbClr val="000000"/>
+              </a:solidFill>
+              <a:latin typeface="Avenir Next LT Pro"/>
+            </a:endParaRPr>
+          </a:p>
+        </p:txBody>
+      </p:sp>
+      <p:pic>
+        <p:nvPicPr>
+          <p:cNvPr id="2" name="Picture 1">
+            <a:extLst>
+              <a:ext uri="{FF2B5EF4-FFF2-40B4-BE49-F238E27FC236}">
+                <a16:creationId xmlns:a16="http://schemas.microsoft.com/office/drawing/2014/main" id="{CD215CD3-7DF3-7AD3-D906-F2535424B244}"/>
+              </a:ext>
+            </a:extLst>
+          </p:cNvPr>
+          <p:cNvPicPr>
+            <a:picLocks noChangeAspect="1"/>
+          </p:cNvPicPr>
+          <p:nvPr/>
+        </p:nvPicPr>
+        <p:blipFill>
+          <a:blip r:embed="rId2"/>
+          <a:stretch>
+            <a:fillRect/>
+          </a:stretch>
+        </p:blipFill>
+        <p:spPr>
+          <a:xfrm>
+            <a:off x="8510224" y="2854593"/>
+            <a:ext cx="3302000" cy="2184400"/>
+          </a:xfrm>
+          <a:prstGeom prst="rect">
+            <a:avLst/>
+          </a:prstGeom>
+        </p:spPr>
+      </p:pic>
+      <p:pic>
+        <p:nvPicPr>
+          <p:cNvPr id="3" name="Picture 2">
+            <a:extLst>
+              <a:ext uri="{FF2B5EF4-FFF2-40B4-BE49-F238E27FC236}">
+                <a16:creationId xmlns:a16="http://schemas.microsoft.com/office/drawing/2014/main" id="{DB0D2E9D-D0D4-93D9-186E-F02F9EAE227A}"/>
+              </a:ext>
+            </a:extLst>
+          </p:cNvPr>
+          <p:cNvPicPr>
+            <a:picLocks noChangeAspect="1"/>
+          </p:cNvPicPr>
+          <p:nvPr/>
+        </p:nvPicPr>
+        <p:blipFill>
+          <a:blip r:embed="rId3"/>
+          <a:stretch>
+            <a:fillRect/>
+          </a:stretch>
+        </p:blipFill>
+        <p:spPr>
+          <a:xfrm>
+            <a:off x="980546" y="1559193"/>
+            <a:ext cx="6805547" cy="4257713"/>
+          </a:xfrm>
+          <a:prstGeom prst="rect">
+            <a:avLst/>
+          </a:prstGeom>
+        </p:spPr>
+      </p:pic>
+    </p:spTree>
+  </p:cSld>
+  <p:clrMapOvr>
+    <a:masterClrMapping/>
+  </p:clrMapOvr>
+  <p:timing>
+    <p:tnLst>
+      <p:par>
+        <p:cTn id="1" dur="indefinite" restart="never" nodeType="tmRoot">
+          <p:childTnLst>
+            <p:seq>
+              <p:cTn id="2" dur="indefinite" nodeType="mainSeq">
+                <p:childTnLst>
+                  <p:par>
+                    <p:cTn id="3" fill="hold">
+                      <p:stCondLst>
+                        <p:cond delay="0"/>
+                      </p:stCondLst>
+                      <p:childTnLst>
+                        <p:par>
+                          <p:cTn id="4" fill="hold">
+                            <p:stCondLst>
+                              <p:cond delay="0"/>
+                            </p:stCondLst>
+                            <p:childTnLst>
+                              <p:par>
+                                <p:cTn id="5" presetID="10" presetClass="entr" fill="hold" nodeType="afterEffect">
+                                  <p:stCondLst>
+                                    <p:cond delay="0"/>
+                                  </p:stCondLst>
+                                  <p:childTnLst>
+                                    <p:set>
+                                      <p:cBhvr>
+                                        <p:cTn id="6" dur="1" fill="hold">
+                                          <p:stCondLst>
+                                            <p:cond delay="0"/>
+                                          </p:stCondLst>
+                                        </p:cTn>
+                                        <p:tgtEl>
+                                          <p:spTgt spid="65"/>
+                                        </p:tgtEl>
+                                        <p:attrNameLst>
+                                          <p:attrName>style.visibility</p:attrName>
+                                        </p:attrNameLst>
+                                      </p:cBhvr>
+                                      <p:to>
+                                        <p:strVal val="visible"/>
+                                      </p:to>
+                                    </p:set>
+                                    <p:animEffect transition="in" filter="fade">
+                                      <p:cBhvr additive="repl">
+                                        <p:cTn id="7" dur="1000"/>
+                                        <p:tgtEl>
+                                          <p:spTgt spid="65"/>
+                                        </p:tgtEl>
+                                      </p:cBhvr>
+                                    </p:animEffect>
+                                  </p:childTnLst>
+                                </p:cTn>
+                              </p:par>
+                            </p:childTnLst>
+                          </p:cTn>
+                        </p:par>
+                      </p:childTnLst>
+                    </p:cTn>
+                  </p:par>
+                </p:childTnLst>
+              </p:cTn>
+              <p:prevCondLst>
+                <p:cond evt="onPrev" delay="0">
+                  <p:tgtEl>
+                    <p:sldTgt/>
+                  </p:tgtEl>
+                </p:cond>
+              </p:prevCondLst>
+              <p:nextCondLst>
+                <p:cond evt="onNext" delay="0">
+                  <p:tgtEl>
+                    <p:sldTgt/>
+                  </p:tgtEl>
+                </p:cond>
+              </p:nextCondLst>
+            </p:seq>
+          </p:childTnLst>
+        </p:cTn>
+      </p:par>
+    </p:tnLst>
+  </p:timing>
+</p:sld>
+</file>
+
+<file path=ppt/slides/slide11.xml><?xml version="1.0" encoding="utf-8"?>
+<p:sld xmlns:a="http://schemas.openxmlformats.org/drawingml/2006/main" xmlns:r="http://schemas.openxmlformats.org/officeDocument/2006/relationships" xmlns:p="http://schemas.openxmlformats.org/presentationml/2006/main">
+  <p:cSld>
+    <p:spTree>
+      <p:nvGrpSpPr>
+        <p:cNvPr id="1" name=""/>
+        <p:cNvGrpSpPr/>
+        <p:nvPr/>
+      </p:nvGrpSpPr>
+      <p:grpSpPr>
+        <a:xfrm>
+          <a:off x="0" y="0"/>
+          <a:ext cx="0" cy="0"/>
+          <a:chOff x="0" y="0"/>
+          <a:chExt cx="0" cy="0"/>
+        </a:xfrm>
+      </p:grpSpPr>
+      <p:sp>
+        <p:nvSpPr>
+          <p:cNvPr id="65" name="PlaceHolder 1"/>
+          <p:cNvSpPr>
+            <a:spLocks noGrp="1"/>
+          </p:cNvSpPr>
+          <p:nvPr>
+            <p:ph type="title"/>
+          </p:nvPr>
+        </p:nvSpPr>
+        <p:spPr>
+          <a:xfrm>
+            <a:off x="838080" y="365760"/>
+            <a:ext cx="10515240" cy="1325160"/>
+          </a:xfrm>
+          <a:prstGeom prst="rect">
+            <a:avLst/>
+          </a:prstGeom>
+          <a:noFill/>
+          <a:ln w="0">
+            <a:noFill/>
+          </a:ln>
+        </p:spPr>
+        <p:txBody>
+          <a:bodyPr anchor="ctr">
+            <a:noAutofit/>
+          </a:bodyPr>
+          <a:lstStyle/>
+          <a:p>
+            <a:pPr indent="0">
+              <a:lnSpc>
+                <a:spcPct val="100000"/>
+              </a:lnSpc>
+              <a:buNone/>
+            </a:pPr>
+            <a:r>
+              <a:rPr lang="en-US" sz="4400" b="1" strike="noStrike" spc="-1" dirty="0">
+                <a:solidFill>
+                  <a:srgbClr val="FFFFFF"/>
+                </a:solidFill>
+                <a:latin typeface="Avenir Next LT Pro"/>
+              </a:rPr>
+              <a:t>Top 5 vehicle types in collisions</a:t>
+            </a:r>
+            <a:endParaRPr lang="en-US" sz="4400" b="0" strike="noStrike" spc="-1" dirty="0">
+              <a:solidFill>
+                <a:srgbClr val="000000"/>
+              </a:solidFill>
+              <a:latin typeface="Avenir Next LT Pro"/>
+            </a:endParaRPr>
+          </a:p>
+        </p:txBody>
+      </p:sp>
+      <p:pic>
+        <p:nvPicPr>
+          <p:cNvPr id="4" name="Picture 3">
+            <a:extLst>
+              <a:ext uri="{FF2B5EF4-FFF2-40B4-BE49-F238E27FC236}">
+                <a16:creationId xmlns:a16="http://schemas.microsoft.com/office/drawing/2014/main" id="{4515C178-89CC-BD38-B0E4-C90F1470AC86}"/>
+              </a:ext>
+            </a:extLst>
+          </p:cNvPr>
+          <p:cNvPicPr>
+            <a:picLocks noChangeAspect="1"/>
+          </p:cNvPicPr>
+          <p:nvPr/>
+        </p:nvPicPr>
+        <p:blipFill>
+          <a:blip r:embed="rId2"/>
+          <a:stretch>
+            <a:fillRect/>
+          </a:stretch>
+        </p:blipFill>
+        <p:spPr>
+          <a:xfrm>
+            <a:off x="204730" y="1840664"/>
+            <a:ext cx="7772400" cy="3639380"/>
+          </a:xfrm>
+          <a:prstGeom prst="rect">
+            <a:avLst/>
+          </a:prstGeom>
+        </p:spPr>
+      </p:pic>
+      <p:pic>
+        <p:nvPicPr>
+          <p:cNvPr id="6" name="Picture 5">
+            <a:extLst>
+              <a:ext uri="{FF2B5EF4-FFF2-40B4-BE49-F238E27FC236}">
+                <a16:creationId xmlns:a16="http://schemas.microsoft.com/office/drawing/2014/main" id="{D6F80583-EF0E-6A3E-E951-A3E759FD9CDD}"/>
+              </a:ext>
+            </a:extLst>
+          </p:cNvPr>
+          <p:cNvPicPr>
+            <a:picLocks noChangeAspect="1"/>
+          </p:cNvPicPr>
+          <p:nvPr/>
+        </p:nvPicPr>
+        <p:blipFill>
+          <a:blip r:embed="rId3"/>
+          <a:stretch>
+            <a:fillRect/>
+          </a:stretch>
+        </p:blipFill>
+        <p:spPr>
+          <a:xfrm>
+            <a:off x="8291570" y="2667306"/>
+            <a:ext cx="3695700" cy="2184400"/>
+          </a:xfrm>
+          <a:prstGeom prst="rect">
+            <a:avLst/>
+          </a:prstGeom>
+        </p:spPr>
+      </p:pic>
+    </p:spTree>
+    <p:extLst>
+      <p:ext uri="{BB962C8B-B14F-4D97-AF65-F5344CB8AC3E}">
+        <p14:creationId xmlns:p14="http://schemas.microsoft.com/office/powerpoint/2010/main" val="4291170891"/>
+      </p:ext>
+    </p:extLst>
+  </p:cSld>
+  <p:clrMapOvr>
+    <a:masterClrMapping/>
+  </p:clrMapOvr>
+  <p:timing>
+    <p:tnLst>
+      <p:par>
+        <p:cTn id="1" dur="indefinite" restart="never" nodeType="tmRoot">
+          <p:childTnLst>
+            <p:seq>
+              <p:cTn id="2" dur="indefinite" nodeType="mainSeq">
+                <p:childTnLst>
+                  <p:par>
+                    <p:cTn id="3" fill="hold">
+                      <p:stCondLst>
+                        <p:cond delay="0"/>
+                      </p:stCondLst>
+                      <p:childTnLst>
+                        <p:par>
+                          <p:cTn id="4" fill="hold">
+                            <p:stCondLst>
+                              <p:cond delay="0"/>
+                            </p:stCondLst>
+                            <p:childTnLst>
+                              <p:par>
+                                <p:cTn id="5" presetID="10" presetClass="entr" fill="hold" nodeType="afterEffect">
+                                  <p:stCondLst>
+                                    <p:cond delay="0"/>
+                                  </p:stCondLst>
+                                  <p:childTnLst>
+                                    <p:set>
+                                      <p:cBhvr>
+                                        <p:cTn id="6" dur="1" fill="hold">
+                                          <p:stCondLst>
+                                            <p:cond delay="0"/>
+                                          </p:stCondLst>
+                                        </p:cTn>
+                                        <p:tgtEl>
+                                          <p:spTgt spid="65"/>
+                                        </p:tgtEl>
+                                        <p:attrNameLst>
+                                          <p:attrName>style.visibility</p:attrName>
+                                        </p:attrNameLst>
+                                      </p:cBhvr>
+                                      <p:to>
+                                        <p:strVal val="visible"/>
+                                      </p:to>
+                                    </p:set>
+                                    <p:animEffect transition="in" filter="fade">
+                                      <p:cBhvr additive="repl">
+                                        <p:cTn id="7" dur="1000"/>
+                                        <p:tgtEl>
+                                          <p:spTgt spid="65"/>
+                                        </p:tgtEl>
+                                      </p:cBhvr>
+                                    </p:animEffect>
+                                  </p:childTnLst>
+                                </p:cTn>
+                              </p:par>
+                            </p:childTnLst>
+                          </p:cTn>
+                        </p:par>
+                      </p:childTnLst>
+                    </p:cTn>
+                  </p:par>
+                </p:childTnLst>
+              </p:cTn>
+              <p:prevCondLst>
+                <p:cond evt="onPrev" delay="0">
+                  <p:tgtEl>
+                    <p:sldTgt/>
+                  </p:tgtEl>
+                </p:cond>
+              </p:prevCondLst>
+              <p:nextCondLst>
+                <p:cond evt="onNext" delay="0">
+                  <p:tgtEl>
+                    <p:sldTgt/>
+                  </p:tgtEl>
+                </p:cond>
+              </p:nextCondLst>
+            </p:seq>
+          </p:childTnLst>
+        </p:cTn>
+      </p:par>
+    </p:tnLst>
+  </p:timing>
+</p:sld>
+</file>
+
+<file path=ppt/slides/slide12.xml><?xml version="1.0" encoding="utf-8"?>
 <p:sld xmlns:a="http://schemas.openxmlformats.org/drawingml/2006/main" xmlns:r="http://schemas.openxmlformats.org/officeDocument/2006/relationships" xmlns:p="http://schemas.openxmlformats.org/presentationml/2006/main">
   <p:cSld>
     <p:spTree>
@@ -5550,6 +5984,382 @@
       </p:grpSpPr>
       <p:sp>
         <p:nvSpPr>
+          <p:cNvPr id="2" name="Title 1">
+            <a:extLst>
+              <a:ext uri="{FF2B5EF4-FFF2-40B4-BE49-F238E27FC236}">
+                <a16:creationId xmlns:a16="http://schemas.microsoft.com/office/drawing/2014/main" id="{3E0EFD54-F1B1-7499-676A-678C9972949C}"/>
+              </a:ext>
+            </a:extLst>
+          </p:cNvPr>
+          <p:cNvSpPr>
+            <a:spLocks noGrp="1"/>
+          </p:cNvSpPr>
+          <p:nvPr>
+            <p:ph type="title"/>
+          </p:nvPr>
+        </p:nvSpPr>
+        <p:spPr/>
+        <p:txBody>
+          <a:bodyPr/>
+          <a:lstStyle/>
+          <a:p>
+            <a:r>
+              <a:rPr lang="en-US" dirty="0">
+                <a:solidFill>
+                  <a:schemeClr val="bg1"/>
+                </a:solidFill>
+              </a:rPr>
+              <a:t>Project Initiation, Git Setup and Collaboration</a:t>
+            </a:r>
+          </a:p>
+        </p:txBody>
+      </p:sp>
+      <p:sp>
+        <p:nvSpPr>
+          <p:cNvPr id="3" name="Subtitle 2">
+            <a:extLst>
+              <a:ext uri="{FF2B5EF4-FFF2-40B4-BE49-F238E27FC236}">
+                <a16:creationId xmlns:a16="http://schemas.microsoft.com/office/drawing/2014/main" id="{E768BF54-C4EE-AA03-D151-703D0357FA88}"/>
+              </a:ext>
+            </a:extLst>
+          </p:cNvPr>
+          <p:cNvSpPr>
+            <a:spLocks noGrp="1"/>
+          </p:cNvSpPr>
+          <p:nvPr>
+            <p:ph type="subTitle"/>
+          </p:nvPr>
+        </p:nvSpPr>
+        <p:spPr>
+          <a:xfrm>
+            <a:off x="838080" y="1690920"/>
+            <a:ext cx="10515240" cy="4195440"/>
+          </a:xfrm>
+        </p:spPr>
+        <p:txBody>
+          <a:bodyPr/>
+          <a:lstStyle/>
+          <a:p>
+            <a:r>
+              <a:rPr lang="en-US" dirty="0">
+                <a:solidFill>
+                  <a:schemeClr val="bg1"/>
+                </a:solidFill>
+              </a:rPr>
+              <a:t>Setup GIT Organization</a:t>
+            </a:r>
+          </a:p>
+          <a:p>
+            <a:r>
+              <a:rPr lang="en-US" dirty="0">
+                <a:solidFill>
+                  <a:schemeClr val="bg1"/>
+                </a:solidFill>
+              </a:rPr>
+              <a:t>Create GIT Repository</a:t>
+            </a:r>
+          </a:p>
+          <a:p>
+            <a:r>
+              <a:rPr lang="en-US" dirty="0">
+                <a:solidFill>
+                  <a:schemeClr val="bg1"/>
+                </a:solidFill>
+              </a:rPr>
+              <a:t>Add Team members to collaborate on the project files.</a:t>
+            </a:r>
+          </a:p>
+          <a:p>
+            <a:r>
+              <a:rPr lang="en-US" dirty="0">
+                <a:solidFill>
+                  <a:schemeClr val="bg1"/>
+                </a:solidFill>
+              </a:rPr>
+              <a:t>All team members cloned the repo and worked effectively to collaborate on the various aspects of the project</a:t>
+            </a:r>
+          </a:p>
+          <a:p>
+            <a:r>
+              <a:rPr lang="en-US" dirty="0">
+                <a:solidFill>
+                  <a:schemeClr val="bg1"/>
+                </a:solidFill>
+              </a:rPr>
+              <a:t>Explored and utilized Git LFS for handling large files over 100MB in Size</a:t>
+            </a:r>
+          </a:p>
+        </p:txBody>
+      </p:sp>
+    </p:spTree>
+    <p:extLst>
+      <p:ext uri="{BB962C8B-B14F-4D97-AF65-F5344CB8AC3E}">
+        <p14:creationId xmlns:p14="http://schemas.microsoft.com/office/powerpoint/2010/main" val="3726271159"/>
+      </p:ext>
+    </p:extLst>
+  </p:cSld>
+  <p:clrMapOvr>
+    <a:masterClrMapping/>
+  </p:clrMapOvr>
+</p:sld>
+</file>
+
+<file path=ppt/slides/slide3.xml><?xml version="1.0" encoding="utf-8"?>
+<p:sld xmlns:a="http://schemas.openxmlformats.org/drawingml/2006/main" xmlns:r="http://schemas.openxmlformats.org/officeDocument/2006/relationships" xmlns:p="http://schemas.openxmlformats.org/presentationml/2006/main">
+  <p:cSld>
+    <p:spTree>
+      <p:nvGrpSpPr>
+        <p:cNvPr id="1" name=""/>
+        <p:cNvGrpSpPr/>
+        <p:nvPr/>
+      </p:nvGrpSpPr>
+      <p:grpSpPr>
+        <a:xfrm>
+          <a:off x="0" y="0"/>
+          <a:ext cx="0" cy="0"/>
+          <a:chOff x="0" y="0"/>
+          <a:chExt cx="0" cy="0"/>
+        </a:xfrm>
+      </p:grpSpPr>
+      <p:sp>
+        <p:nvSpPr>
+          <p:cNvPr id="2" name="Title 1">
+            <a:extLst>
+              <a:ext uri="{FF2B5EF4-FFF2-40B4-BE49-F238E27FC236}">
+                <a16:creationId xmlns:a16="http://schemas.microsoft.com/office/drawing/2014/main" id="{6D94ABB8-4FFD-999D-5D9C-9E688C3731CD}"/>
+              </a:ext>
+            </a:extLst>
+          </p:cNvPr>
+          <p:cNvSpPr>
+            <a:spLocks noGrp="1"/>
+          </p:cNvSpPr>
+          <p:nvPr>
+            <p:ph type="title"/>
+          </p:nvPr>
+        </p:nvSpPr>
+        <p:spPr/>
+        <p:txBody>
+          <a:bodyPr/>
+          <a:lstStyle/>
+          <a:p>
+            <a:r>
+              <a:rPr lang="en-US" sz="4400" b="1" strike="noStrike" spc="-1" dirty="0">
+                <a:solidFill>
+                  <a:srgbClr val="FFFFFF"/>
+                </a:solidFill>
+                <a:latin typeface="Avenir Next LT Pro"/>
+              </a:rPr>
+              <a:t>Project Scope</a:t>
+            </a:r>
+            <a:endParaRPr lang="en-US" dirty="0"/>
+          </a:p>
+        </p:txBody>
+      </p:sp>
+      <p:sp>
+        <p:nvSpPr>
+          <p:cNvPr id="5" name="TextBox 4">
+            <a:extLst>
+              <a:ext uri="{FF2B5EF4-FFF2-40B4-BE49-F238E27FC236}">
+                <a16:creationId xmlns:a16="http://schemas.microsoft.com/office/drawing/2014/main" id="{F64C01EF-EFBC-67B7-0445-BADD5E5F8330}"/>
+              </a:ext>
+            </a:extLst>
+          </p:cNvPr>
+          <p:cNvSpPr txBox="1"/>
+          <p:nvPr/>
+        </p:nvSpPr>
+        <p:spPr>
+          <a:xfrm>
+            <a:off x="838080" y="1690920"/>
+            <a:ext cx="9892349" cy="4832092"/>
+          </a:xfrm>
+          <a:prstGeom prst="rect">
+            <a:avLst/>
+          </a:prstGeom>
+          <a:noFill/>
+        </p:spPr>
+        <p:txBody>
+          <a:bodyPr wrap="square">
+            <a:spAutoFit/>
+          </a:bodyPr>
+          <a:lstStyle/>
+          <a:p>
+            <a:pPr algn="l"/>
+            <a:br>
+              <a:rPr lang="en-US" sz="2000" b="0" i="0" dirty="0">
+                <a:solidFill>
+                  <a:srgbClr val="ADBAC7"/>
+                </a:solidFill>
+                <a:effectLst/>
+                <a:latin typeface="-apple-system"/>
+              </a:rPr>
+            </a:br>
+            <a:r>
+              <a:rPr lang="en-US" sz="2400" b="0" i="0" dirty="0">
+                <a:solidFill>
+                  <a:srgbClr val="ADBAC7"/>
+                </a:solidFill>
+                <a:effectLst/>
+                <a:latin typeface="-apple-system"/>
+              </a:rPr>
+              <a:t>Analyze the NY City Motor vehicle Collision for the period of 2012 through 2023 Project Description/Outline Exploratory data analysis of the motor vehicle collisions in NY city Research Questions:</a:t>
+            </a:r>
+          </a:p>
+          <a:p>
+            <a:pPr algn="l"/>
+            <a:endParaRPr lang="en-US" sz="2400" b="0" i="0" dirty="0">
+              <a:solidFill>
+                <a:srgbClr val="ADBAC7"/>
+              </a:solidFill>
+              <a:effectLst/>
+              <a:latin typeface="-apple-system"/>
+            </a:endParaRPr>
+          </a:p>
+          <a:p>
+            <a:pPr marL="742950" lvl="1" indent="-285750" algn="l">
+              <a:buFont typeface="Arial" panose="020B0604020202020204" pitchFamily="34" charset="0"/>
+              <a:buChar char="•"/>
+            </a:pPr>
+            <a:r>
+              <a:rPr lang="en-US" sz="2400" b="0" i="0" dirty="0">
+                <a:solidFill>
+                  <a:srgbClr val="ADBAC7"/>
+                </a:solidFill>
+                <a:effectLst/>
+                <a:latin typeface="-apple-system"/>
+              </a:rPr>
+              <a:t>Which Borough had more incidents?</a:t>
+            </a:r>
+          </a:p>
+          <a:p>
+            <a:pPr marL="742950" lvl="1" indent="-285750" algn="l">
+              <a:buFont typeface="Arial" panose="020B0604020202020204" pitchFamily="34" charset="0"/>
+              <a:buChar char="•"/>
+            </a:pPr>
+            <a:r>
+              <a:rPr lang="en-US" sz="2400" b="0" i="0" dirty="0">
+                <a:solidFill>
+                  <a:srgbClr val="ADBAC7"/>
+                </a:solidFill>
+                <a:effectLst/>
+                <a:latin typeface="-apple-system"/>
+              </a:rPr>
+              <a:t>What time the collision mostly occurs ?</a:t>
+            </a:r>
+          </a:p>
+          <a:p>
+            <a:pPr marL="742950" lvl="1" indent="-285750" algn="l">
+              <a:buFont typeface="Arial" panose="020B0604020202020204" pitchFamily="34" charset="0"/>
+              <a:buChar char="•"/>
+            </a:pPr>
+            <a:r>
+              <a:rPr lang="en-US" sz="2400" b="0" i="0" dirty="0">
+                <a:solidFill>
+                  <a:srgbClr val="ADBAC7"/>
+                </a:solidFill>
+                <a:effectLst/>
+                <a:latin typeface="-apple-system"/>
+              </a:rPr>
+              <a:t>What kind of vehicles involved in collisions?</a:t>
+            </a:r>
+          </a:p>
+          <a:p>
+            <a:pPr marL="742950" lvl="1" indent="-285750" algn="l">
+              <a:buFont typeface="Arial" panose="020B0604020202020204" pitchFamily="34" charset="0"/>
+              <a:buChar char="•"/>
+            </a:pPr>
+            <a:r>
+              <a:rPr lang="en-US" sz="2400" b="0" i="0" dirty="0">
+                <a:solidFill>
+                  <a:srgbClr val="ADBAC7"/>
+                </a:solidFill>
+                <a:effectLst/>
+                <a:latin typeface="-apple-system"/>
+              </a:rPr>
+              <a:t>Injuries vs Fatalities.</a:t>
+            </a:r>
+          </a:p>
+          <a:p>
+            <a:pPr marL="742950" lvl="1" indent="-285750" algn="l">
+              <a:buFont typeface="Arial" panose="020B0604020202020204" pitchFamily="34" charset="0"/>
+              <a:buChar char="•"/>
+            </a:pPr>
+            <a:r>
+              <a:rPr lang="en-US" sz="2400" b="0" i="0" dirty="0">
+                <a:solidFill>
+                  <a:srgbClr val="ADBAC7"/>
+                </a:solidFill>
+                <a:effectLst/>
+                <a:latin typeface="-apple-system"/>
+              </a:rPr>
+              <a:t>What are the trends of collisions over the years?</a:t>
+            </a:r>
+          </a:p>
+          <a:p>
+            <a:pPr marL="742950" lvl="1" indent="-285750" algn="l">
+              <a:buFont typeface="Arial" panose="020B0604020202020204" pitchFamily="34" charset="0"/>
+              <a:buChar char="•"/>
+            </a:pPr>
+            <a:r>
+              <a:rPr lang="en-US" sz="2400" b="0" i="0" dirty="0">
+                <a:solidFill>
+                  <a:srgbClr val="ADBAC7"/>
+                </a:solidFill>
+                <a:effectLst/>
+                <a:latin typeface="-apple-system"/>
+              </a:rPr>
+              <a:t>What are the contributing factors for majority of the collisions?</a:t>
+            </a:r>
+          </a:p>
+          <a:p>
+            <a:pPr marL="742950" lvl="1" indent="-285750" algn="l">
+              <a:buFont typeface="Arial" panose="020B0604020202020204" pitchFamily="34" charset="0"/>
+              <a:buChar char="•"/>
+            </a:pPr>
+            <a:r>
+              <a:rPr lang="en-US" sz="2400" b="0" i="0" dirty="0">
+                <a:solidFill>
+                  <a:srgbClr val="ADBAC7"/>
+                </a:solidFill>
+                <a:effectLst/>
+                <a:latin typeface="-apple-system"/>
+              </a:rPr>
+              <a:t>Number of Motorists/pedestrians/cyclists/persons involved in the collisions.</a:t>
+            </a:r>
+          </a:p>
+        </p:txBody>
+      </p:sp>
+    </p:spTree>
+    <p:extLst>
+      <p:ext uri="{BB962C8B-B14F-4D97-AF65-F5344CB8AC3E}">
+        <p14:creationId xmlns:p14="http://schemas.microsoft.com/office/powerpoint/2010/main" val="741334644"/>
+      </p:ext>
+    </p:extLst>
+  </p:cSld>
+  <p:clrMapOvr>
+    <a:masterClrMapping/>
+  </p:clrMapOvr>
+</p:sld>
+</file>
+
+<file path=ppt/slides/slide4.xml><?xml version="1.0" encoding="utf-8"?>
+<p:sld xmlns:a="http://schemas.openxmlformats.org/drawingml/2006/main" xmlns:r="http://schemas.openxmlformats.org/officeDocument/2006/relationships" xmlns:p="http://schemas.openxmlformats.org/presentationml/2006/main">
+  <p:cSld>
+    <p:spTree>
+      <p:nvGrpSpPr>
+        <p:cNvPr id="1" name=""/>
+        <p:cNvGrpSpPr/>
+        <p:nvPr/>
+      </p:nvGrpSpPr>
+      <p:grpSpPr>
+        <a:xfrm>
+          <a:off x="0" y="0"/>
+          <a:ext cx="0" cy="0"/>
+          <a:chOff x="0" y="0"/>
+          <a:chExt cx="0" cy="0"/>
+        </a:xfrm>
+      </p:grpSpPr>
+      <p:sp>
+        <p:nvSpPr>
           <p:cNvPr id="50" name="PlaceHolder 1"/>
           <p:cNvSpPr>
             <a:spLocks noGrp="1"/>
@@ -5722,7 +6532,7 @@
 </p:sld>
 </file>
 
-<file path=ppt/slides/slide3.xml><?xml version="1.0" encoding="utf-8"?>
+<file path=ppt/slides/slide5.xml><?xml version="1.0" encoding="utf-8"?>
 <p:sld xmlns:a="http://schemas.openxmlformats.org/drawingml/2006/main" xmlns:r="http://schemas.openxmlformats.org/officeDocument/2006/relationships" xmlns:p="http://schemas.openxmlformats.org/presentationml/2006/main">
   <p:cSld>
     <p:spTree>
@@ -5913,7 +6723,7 @@
 </p:sld>
 </file>
 
-<file path=ppt/slides/slide4.xml><?xml version="1.0" encoding="utf-8"?>
+<file path=ppt/slides/slide6.xml><?xml version="1.0" encoding="utf-8"?>
 <p:sld xmlns:a="http://schemas.openxmlformats.org/drawingml/2006/main" xmlns:r="http://schemas.openxmlformats.org/officeDocument/2006/relationships" xmlns:p="http://schemas.openxmlformats.org/presentationml/2006/main">
   <p:cSld>
     <p:spTree>
@@ -6103,7 +6913,7 @@
 </p:sld>
 </file>
 
-<file path=ppt/slides/slide5.xml><?xml version="1.0" encoding="utf-8"?>
+<file path=ppt/slides/slide7.xml><?xml version="1.0" encoding="utf-8"?>
 <p:sld xmlns:a="http://schemas.openxmlformats.org/drawingml/2006/main" xmlns:r="http://schemas.openxmlformats.org/officeDocument/2006/relationships" xmlns:p="http://schemas.openxmlformats.org/presentationml/2006/main">
   <p:cSld>
     <p:spTree>
@@ -6634,7 +7444,7 @@
 </p:sld>
 </file>
 
-<file path=ppt/slides/slide6.xml><?xml version="1.0" encoding="utf-8"?>
+<file path=ppt/slides/slide8.xml><?xml version="1.0" encoding="utf-8"?>
 <p:sld xmlns:a="http://schemas.openxmlformats.org/drawingml/2006/main" xmlns:r="http://schemas.openxmlformats.org/officeDocument/2006/relationships" xmlns:p="http://schemas.openxmlformats.org/presentationml/2006/main">
   <p:cSld>
     <p:spTree>
@@ -6855,7 +7665,7 @@
 </p:sld>
 </file>
 
-<file path=ppt/slides/slide7.xml><?xml version="1.0" encoding="utf-8"?>
+<file path=ppt/slides/slide9.xml><?xml version="1.0" encoding="utf-8"?>
 <p:sld xmlns:a="http://schemas.openxmlformats.org/drawingml/2006/main" xmlns:r="http://schemas.openxmlformats.org/officeDocument/2006/relationships" xmlns:p="http://schemas.openxmlformats.org/presentationml/2006/main">
   <p:cSld>
     <p:spTree>
@@ -7014,453 +7824,6 @@
                                         <p:cTn id="7" dur="1000"/>
                                         <p:tgtEl>
                                           <p:spTgt spid="59"/>
-                                        </p:tgtEl>
-                                      </p:cBhvr>
-                                    </p:animEffect>
-                                  </p:childTnLst>
-                                </p:cTn>
-                              </p:par>
-                            </p:childTnLst>
-                          </p:cTn>
-                        </p:par>
-                      </p:childTnLst>
-                    </p:cTn>
-                  </p:par>
-                </p:childTnLst>
-              </p:cTn>
-              <p:prevCondLst>
-                <p:cond evt="onPrev" delay="0">
-                  <p:tgtEl>
-                    <p:sldTgt/>
-                  </p:tgtEl>
-                </p:cond>
-              </p:prevCondLst>
-              <p:nextCondLst>
-                <p:cond evt="onNext" delay="0">
-                  <p:tgtEl>
-                    <p:sldTgt/>
-                  </p:tgtEl>
-                </p:cond>
-              </p:nextCondLst>
-            </p:seq>
-          </p:childTnLst>
-        </p:cTn>
-      </p:par>
-    </p:tnLst>
-  </p:timing>
-</p:sld>
-</file>
-
-<file path=ppt/slides/slide8.xml><?xml version="1.0" encoding="utf-8"?>
-<p:sld xmlns:a="http://schemas.openxmlformats.org/drawingml/2006/main" xmlns:r="http://schemas.openxmlformats.org/officeDocument/2006/relationships" xmlns:p="http://schemas.openxmlformats.org/presentationml/2006/main">
-  <p:cSld>
-    <p:spTree>
-      <p:nvGrpSpPr>
-        <p:cNvPr id="1" name=""/>
-        <p:cNvGrpSpPr/>
-        <p:nvPr/>
-      </p:nvGrpSpPr>
-      <p:grpSpPr>
-        <a:xfrm>
-          <a:off x="0" y="0"/>
-          <a:ext cx="0" cy="0"/>
-          <a:chOff x="0" y="0"/>
-          <a:chExt cx="0" cy="0"/>
-        </a:xfrm>
-      </p:grpSpPr>
-      <p:sp>
-        <p:nvSpPr>
-          <p:cNvPr id="65" name="PlaceHolder 1"/>
-          <p:cNvSpPr>
-            <a:spLocks noGrp="1"/>
-          </p:cNvSpPr>
-          <p:nvPr>
-            <p:ph type="title"/>
-          </p:nvPr>
-        </p:nvSpPr>
-        <p:spPr>
-          <a:xfrm>
-            <a:off x="838080" y="365760"/>
-            <a:ext cx="10515240" cy="1325160"/>
-          </a:xfrm>
-          <a:prstGeom prst="rect">
-            <a:avLst/>
-          </a:prstGeom>
-          <a:noFill/>
-          <a:ln w="0">
-            <a:noFill/>
-          </a:ln>
-        </p:spPr>
-        <p:txBody>
-          <a:bodyPr anchor="ctr">
-            <a:noAutofit/>
-          </a:bodyPr>
-          <a:lstStyle/>
-          <a:p>
-            <a:pPr indent="0">
-              <a:lnSpc>
-                <a:spcPct val="100000"/>
-              </a:lnSpc>
-              <a:buNone/>
-            </a:pPr>
-            <a:r>
-              <a:rPr lang="en-US" sz="4400" b="1" strike="noStrike" spc="-1" dirty="0">
-                <a:solidFill>
-                  <a:srgbClr val="FFFFFF"/>
-                </a:solidFill>
-                <a:latin typeface="Avenir Next LT Pro"/>
-              </a:rPr>
-              <a:t>Top 5 factors for collisions</a:t>
-            </a:r>
-            <a:endParaRPr lang="en-US" sz="4400" b="0" strike="noStrike" spc="-1" dirty="0">
-              <a:solidFill>
-                <a:srgbClr val="000000"/>
-              </a:solidFill>
-              <a:latin typeface="Avenir Next LT Pro"/>
-            </a:endParaRPr>
-          </a:p>
-        </p:txBody>
-      </p:sp>
-      <p:pic>
-        <p:nvPicPr>
-          <p:cNvPr id="2" name="Picture 1">
-            <a:extLst>
-              <a:ext uri="{FF2B5EF4-FFF2-40B4-BE49-F238E27FC236}">
-                <a16:creationId xmlns:a16="http://schemas.microsoft.com/office/drawing/2014/main" id="{CD215CD3-7DF3-7AD3-D906-F2535424B244}"/>
-              </a:ext>
-            </a:extLst>
-          </p:cNvPr>
-          <p:cNvPicPr>
-            <a:picLocks noChangeAspect="1"/>
-          </p:cNvPicPr>
-          <p:nvPr/>
-        </p:nvPicPr>
-        <p:blipFill>
-          <a:blip r:embed="rId2"/>
-          <a:stretch>
-            <a:fillRect/>
-          </a:stretch>
-        </p:blipFill>
-        <p:spPr>
-          <a:xfrm>
-            <a:off x="8510224" y="2854593"/>
-            <a:ext cx="3302000" cy="2184400"/>
-          </a:xfrm>
-          <a:prstGeom prst="rect">
-            <a:avLst/>
-          </a:prstGeom>
-        </p:spPr>
-      </p:pic>
-      <p:pic>
-        <p:nvPicPr>
-          <p:cNvPr id="3" name="Picture 2">
-            <a:extLst>
-              <a:ext uri="{FF2B5EF4-FFF2-40B4-BE49-F238E27FC236}">
-                <a16:creationId xmlns:a16="http://schemas.microsoft.com/office/drawing/2014/main" id="{DB0D2E9D-D0D4-93D9-186E-F02F9EAE227A}"/>
-              </a:ext>
-            </a:extLst>
-          </p:cNvPr>
-          <p:cNvPicPr>
-            <a:picLocks noChangeAspect="1"/>
-          </p:cNvPicPr>
-          <p:nvPr/>
-        </p:nvPicPr>
-        <p:blipFill>
-          <a:blip r:embed="rId3"/>
-          <a:stretch>
-            <a:fillRect/>
-          </a:stretch>
-        </p:blipFill>
-        <p:spPr>
-          <a:xfrm>
-            <a:off x="980546" y="1559193"/>
-            <a:ext cx="6805547" cy="4257713"/>
-          </a:xfrm>
-          <a:prstGeom prst="rect">
-            <a:avLst/>
-          </a:prstGeom>
-        </p:spPr>
-      </p:pic>
-    </p:spTree>
-  </p:cSld>
-  <p:clrMapOvr>
-    <a:masterClrMapping/>
-  </p:clrMapOvr>
-  <p:timing>
-    <p:tnLst>
-      <p:par>
-        <p:cTn id="1" dur="indefinite" restart="never" nodeType="tmRoot">
-          <p:childTnLst>
-            <p:seq>
-              <p:cTn id="2" dur="indefinite" nodeType="mainSeq">
-                <p:childTnLst>
-                  <p:par>
-                    <p:cTn id="3" fill="hold">
-                      <p:stCondLst>
-                        <p:cond delay="0"/>
-                      </p:stCondLst>
-                      <p:childTnLst>
-                        <p:par>
-                          <p:cTn id="4" fill="hold">
-                            <p:stCondLst>
-                              <p:cond delay="0"/>
-                            </p:stCondLst>
-                            <p:childTnLst>
-                              <p:par>
-                                <p:cTn id="5" presetID="10" presetClass="entr" fill="hold" nodeType="afterEffect">
-                                  <p:stCondLst>
-                                    <p:cond delay="0"/>
-                                  </p:stCondLst>
-                                  <p:childTnLst>
-                                    <p:set>
-                                      <p:cBhvr>
-                                        <p:cTn id="6" dur="1" fill="hold">
-                                          <p:stCondLst>
-                                            <p:cond delay="0"/>
-                                          </p:stCondLst>
-                                        </p:cTn>
-                                        <p:tgtEl>
-                                          <p:spTgt spid="65"/>
-                                        </p:tgtEl>
-                                        <p:attrNameLst>
-                                          <p:attrName>style.visibility</p:attrName>
-                                        </p:attrNameLst>
-                                      </p:cBhvr>
-                                      <p:to>
-                                        <p:strVal val="visible"/>
-                                      </p:to>
-                                    </p:set>
-                                    <p:animEffect transition="in" filter="fade">
-                                      <p:cBhvr additive="repl">
-                                        <p:cTn id="7" dur="1000"/>
-                                        <p:tgtEl>
-                                          <p:spTgt spid="65"/>
-                                        </p:tgtEl>
-                                      </p:cBhvr>
-                                    </p:animEffect>
-                                  </p:childTnLst>
-                                </p:cTn>
-                              </p:par>
-                            </p:childTnLst>
-                          </p:cTn>
-                        </p:par>
-                      </p:childTnLst>
-                    </p:cTn>
-                  </p:par>
-                </p:childTnLst>
-              </p:cTn>
-              <p:prevCondLst>
-                <p:cond evt="onPrev" delay="0">
-                  <p:tgtEl>
-                    <p:sldTgt/>
-                  </p:tgtEl>
-                </p:cond>
-              </p:prevCondLst>
-              <p:nextCondLst>
-                <p:cond evt="onNext" delay="0">
-                  <p:tgtEl>
-                    <p:sldTgt/>
-                  </p:tgtEl>
-                </p:cond>
-              </p:nextCondLst>
-            </p:seq>
-          </p:childTnLst>
-        </p:cTn>
-      </p:par>
-    </p:tnLst>
-  </p:timing>
-</p:sld>
-</file>
-
-<file path=ppt/slides/slide9.xml><?xml version="1.0" encoding="utf-8"?>
-<p:sld xmlns:a="http://schemas.openxmlformats.org/drawingml/2006/main" xmlns:r="http://schemas.openxmlformats.org/officeDocument/2006/relationships" xmlns:p="http://schemas.openxmlformats.org/presentationml/2006/main">
-  <p:cSld>
-    <p:spTree>
-      <p:nvGrpSpPr>
-        <p:cNvPr id="1" name=""/>
-        <p:cNvGrpSpPr/>
-        <p:nvPr/>
-      </p:nvGrpSpPr>
-      <p:grpSpPr>
-        <a:xfrm>
-          <a:off x="0" y="0"/>
-          <a:ext cx="0" cy="0"/>
-          <a:chOff x="0" y="0"/>
-          <a:chExt cx="0" cy="0"/>
-        </a:xfrm>
-      </p:grpSpPr>
-      <p:sp>
-        <p:nvSpPr>
-          <p:cNvPr id="65" name="PlaceHolder 1"/>
-          <p:cNvSpPr>
-            <a:spLocks noGrp="1"/>
-          </p:cNvSpPr>
-          <p:nvPr>
-            <p:ph type="title"/>
-          </p:nvPr>
-        </p:nvSpPr>
-        <p:spPr>
-          <a:xfrm>
-            <a:off x="838080" y="365760"/>
-            <a:ext cx="10515240" cy="1325160"/>
-          </a:xfrm>
-          <a:prstGeom prst="rect">
-            <a:avLst/>
-          </a:prstGeom>
-          <a:noFill/>
-          <a:ln w="0">
-            <a:noFill/>
-          </a:ln>
-        </p:spPr>
-        <p:txBody>
-          <a:bodyPr anchor="ctr">
-            <a:noAutofit/>
-          </a:bodyPr>
-          <a:lstStyle/>
-          <a:p>
-            <a:pPr indent="0">
-              <a:lnSpc>
-                <a:spcPct val="100000"/>
-              </a:lnSpc>
-              <a:buNone/>
-            </a:pPr>
-            <a:r>
-              <a:rPr lang="en-US" sz="4400" b="1" strike="noStrike" spc="-1" dirty="0">
-                <a:solidFill>
-                  <a:srgbClr val="FFFFFF"/>
-                </a:solidFill>
-                <a:latin typeface="Avenir Next LT Pro"/>
-              </a:rPr>
-              <a:t>Top 5 vehicle types in collisions</a:t>
-            </a:r>
-            <a:endParaRPr lang="en-US" sz="4400" b="0" strike="noStrike" spc="-1" dirty="0">
-              <a:solidFill>
-                <a:srgbClr val="000000"/>
-              </a:solidFill>
-              <a:latin typeface="Avenir Next LT Pro"/>
-            </a:endParaRPr>
-          </a:p>
-        </p:txBody>
-      </p:sp>
-      <p:pic>
-        <p:nvPicPr>
-          <p:cNvPr id="4" name="Picture 3">
-            <a:extLst>
-              <a:ext uri="{FF2B5EF4-FFF2-40B4-BE49-F238E27FC236}">
-                <a16:creationId xmlns:a16="http://schemas.microsoft.com/office/drawing/2014/main" id="{4515C178-89CC-BD38-B0E4-C90F1470AC86}"/>
-              </a:ext>
-            </a:extLst>
-          </p:cNvPr>
-          <p:cNvPicPr>
-            <a:picLocks noChangeAspect="1"/>
-          </p:cNvPicPr>
-          <p:nvPr/>
-        </p:nvPicPr>
-        <p:blipFill>
-          <a:blip r:embed="rId2"/>
-          <a:stretch>
-            <a:fillRect/>
-          </a:stretch>
-        </p:blipFill>
-        <p:spPr>
-          <a:xfrm>
-            <a:off x="204730" y="1840664"/>
-            <a:ext cx="7772400" cy="3639380"/>
-          </a:xfrm>
-          <a:prstGeom prst="rect">
-            <a:avLst/>
-          </a:prstGeom>
-        </p:spPr>
-      </p:pic>
-      <p:pic>
-        <p:nvPicPr>
-          <p:cNvPr id="6" name="Picture 5">
-            <a:extLst>
-              <a:ext uri="{FF2B5EF4-FFF2-40B4-BE49-F238E27FC236}">
-                <a16:creationId xmlns:a16="http://schemas.microsoft.com/office/drawing/2014/main" id="{D6F80583-EF0E-6A3E-E951-A3E759FD9CDD}"/>
-              </a:ext>
-            </a:extLst>
-          </p:cNvPr>
-          <p:cNvPicPr>
-            <a:picLocks noChangeAspect="1"/>
-          </p:cNvPicPr>
-          <p:nvPr/>
-        </p:nvPicPr>
-        <p:blipFill>
-          <a:blip r:embed="rId3"/>
-          <a:stretch>
-            <a:fillRect/>
-          </a:stretch>
-        </p:blipFill>
-        <p:spPr>
-          <a:xfrm>
-            <a:off x="8291570" y="2667306"/>
-            <a:ext cx="3695700" cy="2184400"/>
-          </a:xfrm>
-          <a:prstGeom prst="rect">
-            <a:avLst/>
-          </a:prstGeom>
-        </p:spPr>
-      </p:pic>
-    </p:spTree>
-    <p:extLst>
-      <p:ext uri="{BB962C8B-B14F-4D97-AF65-F5344CB8AC3E}">
-        <p14:creationId xmlns:p14="http://schemas.microsoft.com/office/powerpoint/2010/main" val="4291170891"/>
-      </p:ext>
-    </p:extLst>
-  </p:cSld>
-  <p:clrMapOvr>
-    <a:masterClrMapping/>
-  </p:clrMapOvr>
-  <p:timing>
-    <p:tnLst>
-      <p:par>
-        <p:cTn id="1" dur="indefinite" restart="never" nodeType="tmRoot">
-          <p:childTnLst>
-            <p:seq>
-              <p:cTn id="2" dur="indefinite" nodeType="mainSeq">
-                <p:childTnLst>
-                  <p:par>
-                    <p:cTn id="3" fill="hold">
-                      <p:stCondLst>
-                        <p:cond delay="0"/>
-                      </p:stCondLst>
-                      <p:childTnLst>
-                        <p:par>
-                          <p:cTn id="4" fill="hold">
-                            <p:stCondLst>
-                              <p:cond delay="0"/>
-                            </p:stCondLst>
-                            <p:childTnLst>
-                              <p:par>
-                                <p:cTn id="5" presetID="10" presetClass="entr" fill="hold" nodeType="afterEffect">
-                                  <p:stCondLst>
-                                    <p:cond delay="0"/>
-                                  </p:stCondLst>
-                                  <p:childTnLst>
-                                    <p:set>
-                                      <p:cBhvr>
-                                        <p:cTn id="6" dur="1" fill="hold">
-                                          <p:stCondLst>
-                                            <p:cond delay="0"/>
-                                          </p:stCondLst>
-                                        </p:cTn>
-                                        <p:tgtEl>
-                                          <p:spTgt spid="65"/>
-                                        </p:tgtEl>
-                                        <p:attrNameLst>
-                                          <p:attrName>style.visibility</p:attrName>
-                                        </p:attrNameLst>
-                                      </p:cBhvr>
-                                      <p:to>
-                                        <p:strVal val="visible"/>
-                                      </p:to>
-                                    </p:set>
-                                    <p:animEffect transition="in" filter="fade">
-                                      <p:cBhvr additive="repl">
-                                        <p:cTn id="7" dur="1000"/>
-                                        <p:tgtEl>
-                                          <p:spTgt spid="65"/>
                                         </p:tgtEl>
                                       </p:cBhvr>
                                     </p:animEffect>

</xml_diff>

<commit_message>
the text on slide 2 of deck cleaned
</commit_message>
<xml_diff>
--- a/New York City Traffic Analysis.pptx
+++ b/New York City Traffic Analysis.pptx
@@ -6040,50 +6040,95 @@
           <a:bodyPr/>
           <a:lstStyle/>
           <a:p>
+            <a:pPr marL="342900" indent="-342900">
+              <a:lnSpc>
+                <a:spcPct val="150000"/>
+              </a:lnSpc>
+              <a:buFont typeface="Arial" panose="020B0604020202020204" pitchFamily="34" charset="0"/>
+              <a:buChar char="•"/>
+            </a:pPr>
             <a:r>
-              <a:rPr lang="en-US" dirty="0">
+              <a:rPr lang="en-US" sz="2400" dirty="0">
                 <a:solidFill>
-                  <a:schemeClr val="bg1"/>
+                  <a:schemeClr val="bg1">
+                    <a:lumMod val="75000"/>
+                  </a:schemeClr>
                 </a:solidFill>
               </a:rPr>
               <a:t>Setup GIT Organization</a:t>
             </a:r>
           </a:p>
           <a:p>
+            <a:pPr marL="342900" indent="-342900">
+              <a:lnSpc>
+                <a:spcPct val="150000"/>
+              </a:lnSpc>
+              <a:buFont typeface="Arial" panose="020B0604020202020204" pitchFamily="34" charset="0"/>
+              <a:buChar char="•"/>
+            </a:pPr>
             <a:r>
-              <a:rPr lang="en-US" dirty="0">
+              <a:rPr lang="en-US" sz="2400" dirty="0">
                 <a:solidFill>
-                  <a:schemeClr val="bg1"/>
+                  <a:schemeClr val="bg1">
+                    <a:lumMod val="75000"/>
+                  </a:schemeClr>
                 </a:solidFill>
               </a:rPr>
               <a:t>Create GIT Repository</a:t>
             </a:r>
           </a:p>
           <a:p>
+            <a:pPr marL="342900" indent="-342900">
+              <a:lnSpc>
+                <a:spcPct val="150000"/>
+              </a:lnSpc>
+              <a:buFont typeface="Arial" panose="020B0604020202020204" pitchFamily="34" charset="0"/>
+              <a:buChar char="•"/>
+            </a:pPr>
             <a:r>
-              <a:rPr lang="en-US" dirty="0">
+              <a:rPr lang="en-US" sz="2400" dirty="0">
                 <a:solidFill>
-                  <a:schemeClr val="bg1"/>
+                  <a:schemeClr val="bg1">
+                    <a:lumMod val="75000"/>
+                  </a:schemeClr>
                 </a:solidFill>
               </a:rPr>
               <a:t>Add Team members to collaborate on the project files.</a:t>
             </a:r>
           </a:p>
           <a:p>
+            <a:pPr marL="342900" indent="-342900">
+              <a:lnSpc>
+                <a:spcPct val="150000"/>
+              </a:lnSpc>
+              <a:buFont typeface="Arial" panose="020B0604020202020204" pitchFamily="34" charset="0"/>
+              <a:buChar char="•"/>
+            </a:pPr>
             <a:r>
-              <a:rPr lang="en-US" dirty="0">
+              <a:rPr lang="en-US" sz="2400" dirty="0">
                 <a:solidFill>
-                  <a:schemeClr val="bg1"/>
+                  <a:schemeClr val="bg1">
+                    <a:lumMod val="75000"/>
+                  </a:schemeClr>
                 </a:solidFill>
               </a:rPr>
               <a:t>All team members cloned the repo and worked effectively to collaborate on the various aspects of the project</a:t>
             </a:r>
           </a:p>
           <a:p>
+            <a:pPr marL="342900" indent="-342900">
+              <a:lnSpc>
+                <a:spcPct val="150000"/>
+              </a:lnSpc>
+              <a:buFont typeface="Arial" panose="020B0604020202020204" pitchFamily="34" charset="0"/>
+              <a:buChar char="•"/>
+            </a:pPr>
             <a:r>
-              <a:rPr lang="en-US" dirty="0">
+              <a:rPr lang="en-US" sz="2400" dirty="0">
                 <a:solidFill>
-                  <a:schemeClr val="bg1"/>
+                  <a:schemeClr val="bg1">
+                    <a:lumMod val="75000"/>
+                  </a:schemeClr>
                 </a:solidFill>
               </a:rPr>
               <a:t>Explored and utilized Git LFS for handling large files over 100MB in Size</a:t>

</xml_diff>